<commit_message>
adapted font sizes, changed font weight, rearranged frames
</commit_message>
<xml_diff>
--- a/Presentation EIT de.pptx
+++ b/Presentation EIT de.pptx
@@ -242,7 +242,7 @@
           <a:p>
             <a:fld id="{8A98A522-022A-DE42-AE0F-3F297654DEB1}" type="datetime1">
               <a:rPr lang="de-DE" smtClean="0"/>
-              <a:t>30.09.16</a:t>
+              <a:t>24.01.17</a:t>
             </a:fld>
             <a:endParaRPr lang="de-DE"/>
           </a:p>
@@ -408,7 +408,7 @@
           <a:p>
             <a:fld id="{6369775B-D8D0-A847-ABC6-465B2BAD3F7E}" type="datetime1">
               <a:rPr lang="de-DE" smtClean="0"/>
-              <a:t>30.09.16</a:t>
+              <a:t>24.01.17</a:t>
             </a:fld>
             <a:endParaRPr lang="de-DE"/>
           </a:p>
@@ -847,7 +847,7 @@
 
 <file path=ppt/slideLayouts/slideLayout1.xml><?xml version="1.0" encoding="utf-8"?>
 <p:sldLayout xmlns:a="http://schemas.openxmlformats.org/drawingml/2006/main" xmlns:r="http://schemas.openxmlformats.org/officeDocument/2006/relationships" xmlns:p="http://schemas.openxmlformats.org/presentationml/2006/main" showMasterSp="0" preserve="1" userDrawn="1">
-  <p:cSld name="Titelfolie">
+  <p:cSld name="Title slide">
     <p:bg>
       <p:bgPr>
         <a:solidFill>
@@ -912,7 +912,7 @@
         </p:nvSpPr>
         <p:spPr>
           <a:xfrm>
-            <a:off x="688428" y="3515299"/>
+            <a:off x="467544" y="3435846"/>
             <a:ext cx="7726572" cy="474811"/>
           </a:xfrm>
           <a:prstGeom prst="rect">
@@ -926,7 +926,7 @@
           <a:lstStyle>
             <a:lvl1pPr marL="0" indent="0" algn="l">
               <a:buNone/>
-              <a:defRPr>
+              <a:defRPr sz="2000" b="0">
                 <a:solidFill>
                   <a:schemeClr val="tx1">
                     <a:tint val="75000"/>
@@ -1053,7 +1053,7 @@
           <a:p>
             <a:fld id="{7EDE8321-4336-2E46-9078-CFF455E3E1C9}" type="datetime1">
               <a:rPr lang="de-DE" smtClean="0"/>
-              <a:t>30.09.16</a:t>
+              <a:t>24.01.17</a:t>
             </a:fld>
             <a:r>
               <a:rPr lang="de-DE" smtClean="0"/>
@@ -1075,8 +1075,8 @@
         </p:nvSpPr>
         <p:spPr>
           <a:xfrm>
-            <a:off x="688428" y="2662090"/>
-            <a:ext cx="7726572" cy="629740"/>
+            <a:off x="467544" y="2878114"/>
+            <a:ext cx="7726572" cy="557732"/>
           </a:xfrm>
           <a:prstGeom prst="rect">
             <a:avLst/>
@@ -1088,7 +1088,7 @@
           </a:bodyPr>
           <a:lstStyle>
             <a:lvl1pPr algn="l">
-              <a:defRPr sz="4000" b="1">
+              <a:defRPr sz="2800" b="1">
                 <a:solidFill>
                   <a:schemeClr val="tx2"/>
                 </a:solidFill>
@@ -1141,12 +1141,19 @@
   <p:clrMapOvr>
     <a:masterClrMapping/>
   </p:clrMapOvr>
+  <p:timing>
+    <p:tnLst>
+      <p:par>
+        <p:cTn id="1" dur="indefinite" restart="never" nodeType="tmRoot"/>
+      </p:par>
+    </p:tnLst>
+  </p:timing>
 </p:sldLayout>
 </file>
 
 <file path=ppt/slideLayouts/slideLayout2.xml><?xml version="1.0" encoding="utf-8"?>
 <p:sldLayout xmlns:a="http://schemas.openxmlformats.org/drawingml/2006/main" xmlns:r="http://schemas.openxmlformats.org/officeDocument/2006/relationships" xmlns:p="http://schemas.openxmlformats.org/presentationml/2006/main" preserve="1" userDrawn="1">
-  <p:cSld name="Titel und Inhalt">
+  <p:cSld name="Title and Content">
     <p:spTree>
       <p:nvGrpSpPr>
         <p:cNvPr id="1" name=""/>
@@ -1173,8 +1180,8 @@
         </p:nvSpPr>
         <p:spPr>
           <a:xfrm>
-            <a:off x="561600" y="1347615"/>
-            <a:ext cx="8125200" cy="3247008"/>
+            <a:off x="179512" y="1419621"/>
+            <a:ext cx="8784976" cy="3175001"/>
           </a:xfrm>
           <a:prstGeom prst="rect">
             <a:avLst/>
@@ -1187,7 +1194,7 @@
               <a:spcBef>
                 <a:spcPts val="600"/>
               </a:spcBef>
-              <a:defRPr sz="2400" b="1">
+              <a:defRPr sz="2000" b="0">
                 <a:latin typeface="PT Sans" charset="-52"/>
                 <a:ea typeface="PT Sans" charset="-52"/>
                 <a:cs typeface="PT Sans" charset="-52"/>
@@ -1200,7 +1207,7 @@
               <a:spcAft>
                 <a:spcPts val="0"/>
               </a:spcAft>
-              <a:defRPr sz="1800" b="1">
+              <a:defRPr sz="1800" b="0">
                 <a:latin typeface="PT Sans" charset="-52"/>
                 <a:ea typeface="PT Sans" charset="-52"/>
                 <a:cs typeface="PT Sans" charset="-52"/>
@@ -1210,7 +1217,7 @@
               <a:spcBef>
                 <a:spcPts val="300"/>
               </a:spcBef>
-              <a:defRPr sz="1800" b="1">
+              <a:defRPr sz="1800" b="0">
                 <a:latin typeface="PT Sans" charset="-52"/>
                 <a:ea typeface="PT Sans" charset="-52"/>
                 <a:cs typeface="PT Sans" charset="-52"/>
@@ -1220,7 +1227,7 @@
               <a:spcBef>
                 <a:spcPts val="0"/>
               </a:spcBef>
-              <a:defRPr sz="1800">
+              <a:defRPr sz="1800" b="0">
                 <a:latin typeface="PT Sans" charset="-52"/>
                 <a:ea typeface="PT Sans" charset="-52"/>
                 <a:cs typeface="PT Sans" charset="-52"/>
@@ -1230,7 +1237,7 @@
               <a:spcBef>
                 <a:spcPts val="0"/>
               </a:spcBef>
-              <a:defRPr sz="1800">
+              <a:defRPr sz="1800" b="0">
                 <a:latin typeface="PT Sans" charset="-52"/>
                 <a:ea typeface="PT Sans" charset="-52"/>
                 <a:cs typeface="PT Sans" charset="-52"/>
@@ -1287,8 +1294,8 @@
         </p:nvSpPr>
         <p:spPr>
           <a:xfrm>
-            <a:off x="561600" y="685957"/>
-            <a:ext cx="8125200" cy="589649"/>
+            <a:off x="179512" y="843557"/>
+            <a:ext cx="8784976" cy="504057"/>
           </a:xfrm>
           <a:prstGeom prst="rect">
             <a:avLst/>
@@ -1300,7 +1307,7 @@
           </a:bodyPr>
           <a:lstStyle>
             <a:lvl1pPr algn="l">
-              <a:defRPr sz="3200" b="1">
+              <a:defRPr sz="2800" b="1">
                 <a:solidFill>
                   <a:schemeClr val="tx2"/>
                 </a:solidFill>
@@ -1332,7 +1339,7 @@
           <a:p>
             <a:fld id="{0D0BEEEE-7771-FC4B-9EAD-6B2B54CF3879}" type="datetime1">
               <a:rPr lang="de-DE" smtClean="0"/>
-              <a:t>30.09.16</a:t>
+              <a:t>24.01.17</a:t>
             </a:fld>
             <a:endParaRPr lang="de-DE" dirty="0" smtClean="0"/>
           </a:p>
@@ -1395,12 +1402,19 @@
   <p:clrMapOvr>
     <a:masterClrMapping/>
   </p:clrMapOvr>
+  <p:timing>
+    <p:tnLst>
+      <p:par>
+        <p:cTn id="1" dur="indefinite" restart="never" nodeType="tmRoot"/>
+      </p:par>
+    </p:tnLst>
+  </p:timing>
 </p:sldLayout>
 </file>
 
 <file path=ppt/slideLayouts/slideLayout3.xml><?xml version="1.0" encoding="utf-8"?>
 <p:sldLayout xmlns:a="http://schemas.openxmlformats.org/drawingml/2006/main" xmlns:r="http://schemas.openxmlformats.org/officeDocument/2006/relationships" xmlns:p="http://schemas.openxmlformats.org/presentationml/2006/main" preserve="1" userDrawn="1">
-  <p:cSld name="nur Titel">
+  <p:cSld name="Title Only">
     <p:spTree>
       <p:nvGrpSpPr>
         <p:cNvPr id="1" name=""/>
@@ -1417,7 +1431,77 @@
       </p:grpSpPr>
       <p:sp>
         <p:nvSpPr>
-          <p:cNvPr id="7" name="Titel 1"/>
+          <p:cNvPr id="10" name="Date Placeholder 9"/>
+          <p:cNvSpPr>
+            <a:spLocks noGrp="1"/>
+          </p:cNvSpPr>
+          <p:nvPr>
+            <p:ph type="dt" sz="half" idx="10"/>
+          </p:nvPr>
+        </p:nvSpPr>
+        <p:spPr/>
+        <p:txBody>
+          <a:bodyPr/>
+          <a:lstStyle/>
+          <a:p>
+            <a:fld id="{0D0BEEEE-7771-FC4B-9EAD-6B2B54CF3879}" type="datetime1">
+              <a:rPr lang="de-DE" smtClean="0"/>
+              <a:t>24.01.17</a:t>
+            </a:fld>
+            <a:endParaRPr lang="de-DE" dirty="0" smtClean="0"/>
+          </a:p>
+        </p:txBody>
+      </p:sp>
+      <p:sp>
+        <p:nvSpPr>
+          <p:cNvPr id="11" name="Footer Placeholder 10"/>
+          <p:cNvSpPr>
+            <a:spLocks noGrp="1"/>
+          </p:cNvSpPr>
+          <p:nvPr>
+            <p:ph type="ftr" sz="quarter" idx="11"/>
+          </p:nvPr>
+        </p:nvSpPr>
+        <p:spPr/>
+        <p:txBody>
+          <a:bodyPr/>
+          <a:lstStyle/>
+          <a:p>
+            <a:r>
+              <a:rPr lang="de-DE" smtClean="0"/>
+              <a:t>&lt;Footertext&gt;</a:t>
+            </a:r>
+            <a:endParaRPr lang="de-DE" dirty="0" smtClean="0"/>
+          </a:p>
+        </p:txBody>
+      </p:sp>
+      <p:sp>
+        <p:nvSpPr>
+          <p:cNvPr id="12" name="Slide Number Placeholder 11"/>
+          <p:cNvSpPr>
+            <a:spLocks noGrp="1"/>
+          </p:cNvSpPr>
+          <p:nvPr>
+            <p:ph type="sldNum" sz="quarter" idx="12"/>
+          </p:nvPr>
+        </p:nvSpPr>
+        <p:spPr/>
+        <p:txBody>
+          <a:bodyPr/>
+          <a:lstStyle/>
+          <a:p>
+            <a:fld id="{8271DC61-FD4F-6F42-810D-876D2F91EC3B}" type="slidenum">
+              <a:rPr lang="de-DE" smtClean="0"/>
+              <a:pPr/>
+              <a:t>‹#›</a:t>
+            </a:fld>
+            <a:endParaRPr lang="de-DE" dirty="0"/>
+          </a:p>
+        </p:txBody>
+      </p:sp>
+      <p:sp>
+        <p:nvSpPr>
+          <p:cNvPr id="6" name="Titel 1"/>
           <p:cNvSpPr>
             <a:spLocks noGrp="1"/>
           </p:cNvSpPr>
@@ -1427,8 +1511,8 @@
         </p:nvSpPr>
         <p:spPr>
           <a:xfrm>
-            <a:off x="561600" y="685957"/>
-            <a:ext cx="8125200" cy="589649"/>
+            <a:off x="179512" y="843557"/>
+            <a:ext cx="8784976" cy="504057"/>
           </a:xfrm>
           <a:prstGeom prst="rect">
             <a:avLst/>
@@ -1440,7 +1524,7 @@
           </a:bodyPr>
           <a:lstStyle>
             <a:lvl1pPr algn="l">
-              <a:defRPr sz="3200" b="1">
+              <a:defRPr sz="2800" b="1">
                 <a:solidFill>
                   <a:schemeClr val="tx2"/>
                 </a:solidFill>
@@ -1455,88 +1539,25 @@
           </a:p>
         </p:txBody>
       </p:sp>
-      <p:sp>
-        <p:nvSpPr>
-          <p:cNvPr id="10" name="Date Placeholder 9"/>
-          <p:cNvSpPr>
-            <a:spLocks noGrp="1"/>
-          </p:cNvSpPr>
-          <p:nvPr>
-            <p:ph type="dt" sz="half" idx="10"/>
-          </p:nvPr>
-        </p:nvSpPr>
-        <p:spPr/>
-        <p:txBody>
-          <a:bodyPr/>
-          <a:lstStyle/>
-          <a:p>
-            <a:fld id="{0D0BEEEE-7771-FC4B-9EAD-6B2B54CF3879}" type="datetime1">
-              <a:rPr lang="de-DE" smtClean="0"/>
-              <a:t>30.09.16</a:t>
-            </a:fld>
-            <a:endParaRPr lang="de-DE" dirty="0" smtClean="0"/>
-          </a:p>
-        </p:txBody>
-      </p:sp>
-      <p:sp>
-        <p:nvSpPr>
-          <p:cNvPr id="11" name="Footer Placeholder 10"/>
-          <p:cNvSpPr>
-            <a:spLocks noGrp="1"/>
-          </p:cNvSpPr>
-          <p:nvPr>
-            <p:ph type="ftr" sz="quarter" idx="11"/>
-          </p:nvPr>
-        </p:nvSpPr>
-        <p:spPr/>
-        <p:txBody>
-          <a:bodyPr/>
-          <a:lstStyle/>
-          <a:p>
-            <a:r>
-              <a:rPr lang="de-DE" smtClean="0"/>
-              <a:t>&lt;Footertext&gt;</a:t>
-            </a:r>
-            <a:endParaRPr lang="de-DE" dirty="0" smtClean="0"/>
-          </a:p>
-        </p:txBody>
-      </p:sp>
-      <p:sp>
-        <p:nvSpPr>
-          <p:cNvPr id="12" name="Slide Number Placeholder 11"/>
-          <p:cNvSpPr>
-            <a:spLocks noGrp="1"/>
-          </p:cNvSpPr>
-          <p:nvPr>
-            <p:ph type="sldNum" sz="quarter" idx="12"/>
-          </p:nvPr>
-        </p:nvSpPr>
-        <p:spPr/>
-        <p:txBody>
-          <a:bodyPr/>
-          <a:lstStyle/>
-          <a:p>
-            <a:fld id="{8271DC61-FD4F-6F42-810D-876D2F91EC3B}" type="slidenum">
-              <a:rPr lang="de-DE" smtClean="0"/>
-              <a:pPr/>
-              <a:t>‹#›</a:t>
-            </a:fld>
-            <a:endParaRPr lang="de-DE" dirty="0"/>
-          </a:p>
-        </p:txBody>
-      </p:sp>
     </p:spTree>
     <p:extLst/>
   </p:cSld>
   <p:clrMapOvr>
     <a:masterClrMapping/>
   </p:clrMapOvr>
+  <p:timing>
+    <p:tnLst>
+      <p:par>
+        <p:cTn id="1" dur="indefinite" restart="never" nodeType="tmRoot"/>
+      </p:par>
+    </p:tnLst>
+  </p:timing>
 </p:sldLayout>
 </file>
 
 <file path=ppt/slideLayouts/slideLayout4.xml><?xml version="1.0" encoding="utf-8"?>
 <p:sldLayout xmlns:a="http://schemas.openxmlformats.org/drawingml/2006/main" xmlns:r="http://schemas.openxmlformats.org/officeDocument/2006/relationships" xmlns:p="http://schemas.openxmlformats.org/presentationml/2006/main" preserve="1" userDrawn="1">
-  <p:cSld name="zwei Inhalte">
+  <p:cSld name="Two Columns">
     <p:spTree>
       <p:nvGrpSpPr>
         <p:cNvPr id="1" name=""/>
@@ -1563,8 +1584,8 @@
         </p:nvSpPr>
         <p:spPr>
           <a:xfrm>
-            <a:off x="561600" y="685958"/>
-            <a:ext cx="3859260" cy="589649"/>
+            <a:off x="179512" y="843558"/>
+            <a:ext cx="4248472" cy="504057"/>
           </a:xfrm>
           <a:prstGeom prst="rect">
             <a:avLst/>
@@ -1576,7 +1597,7 @@
           </a:bodyPr>
           <a:lstStyle>
             <a:lvl1pPr algn="l">
-              <a:defRPr sz="3200" b="1">
+              <a:defRPr sz="2800" b="1">
                 <a:solidFill>
                   <a:schemeClr val="tx2"/>
                 </a:solidFill>
@@ -1608,7 +1629,7 @@
           <a:p>
             <a:fld id="{8EBE2C77-C78C-1440-BCB5-0972AB3B7D88}" type="datetime1">
               <a:rPr lang="de-DE" smtClean="0"/>
-              <a:t>30.09.16</a:t>
+              <a:t>24.01.17</a:t>
             </a:fld>
             <a:endParaRPr lang="de-DE" dirty="0" smtClean="0"/>
           </a:p>
@@ -1673,8 +1694,8 @@
         </p:nvSpPr>
         <p:spPr>
           <a:xfrm>
-            <a:off x="4837113" y="685801"/>
-            <a:ext cx="3849687" cy="589806"/>
+            <a:off x="4644008" y="843161"/>
+            <a:ext cx="4291308" cy="504057"/>
           </a:xfrm>
           <a:prstGeom prst="rect">
             <a:avLst/>
@@ -1688,7 +1709,7 @@
                 <a:spcPct val="0"/>
               </a:spcBef>
               <a:buNone/>
-              <a:defRPr lang="en-US" sz="3200" b="1" kern="1200" dirty="0" smtClean="0">
+              <a:defRPr lang="en-US" sz="2800" b="1" kern="1200" dirty="0" smtClean="0">
                 <a:solidFill>
                   <a:schemeClr val="tx2"/>
                 </a:solidFill>
@@ -1734,8 +1755,8 @@
         </p:nvSpPr>
         <p:spPr>
           <a:xfrm>
-            <a:off x="561600" y="1347615"/>
-            <a:ext cx="3859260" cy="3247008"/>
+            <a:off x="179512" y="1419621"/>
+            <a:ext cx="4248472" cy="3175001"/>
           </a:xfrm>
           <a:prstGeom prst="rect">
             <a:avLst/>
@@ -1745,89 +1766,94 @@
           <a:bodyPr/>
           <a:lstStyle>
             <a:lvl1pPr>
+              <a:defRPr lang="de-DE" sz="2000" b="0" dirty="0" smtClean="0">
+                <a:latin typeface="PT Sans" charset="-52"/>
+                <a:ea typeface="PT Sans" charset="-52"/>
+                <a:cs typeface="PT Sans" charset="-52"/>
+              </a:defRPr>
+            </a:lvl1pPr>
+            <a:lvl2pPr>
+              <a:defRPr lang="de-DE" sz="1800" b="0" dirty="0" smtClean="0">
+                <a:latin typeface="PT Sans" charset="-52"/>
+                <a:ea typeface="PT Sans" charset="-52"/>
+                <a:cs typeface="PT Sans" charset="-52"/>
+              </a:defRPr>
+            </a:lvl2pPr>
+            <a:lvl3pPr>
+              <a:defRPr lang="de-DE" sz="1800" b="0" dirty="0" smtClean="0">
+                <a:latin typeface="PT Sans" charset="-52"/>
+                <a:ea typeface="PT Sans" charset="-52"/>
+                <a:cs typeface="PT Sans" charset="-52"/>
+              </a:defRPr>
+            </a:lvl3pPr>
+            <a:lvl4pPr>
+              <a:defRPr lang="de-DE" sz="1800" dirty="0" smtClean="0">
+                <a:latin typeface="PT Sans" charset="-52"/>
+                <a:ea typeface="PT Sans" charset="-52"/>
+                <a:cs typeface="PT Sans" charset="-52"/>
+              </a:defRPr>
+            </a:lvl4pPr>
+            <a:lvl5pPr>
+              <a:defRPr lang="de-DE" sz="1800" b="0" dirty="0">
+                <a:latin typeface="PT Sans" charset="-52"/>
+                <a:ea typeface="PT Sans" charset="-52"/>
+                <a:cs typeface="PT Sans" charset="-52"/>
+              </a:defRPr>
+            </a:lvl5pPr>
+          </a:lstStyle>
+          <a:p>
+            <a:pPr lvl="0">
               <a:spcBef>
                 <a:spcPts val="600"/>
               </a:spcBef>
-              <a:defRPr sz="2400" b="1">
-                <a:latin typeface="PT Sans" charset="-52"/>
-                <a:ea typeface="PT Sans" charset="-52"/>
-                <a:cs typeface="PT Sans" charset="-52"/>
-              </a:defRPr>
-            </a:lvl1pPr>
-            <a:lvl2pPr>
+            </a:pPr>
+            <a:r>
+              <a:rPr lang="de-DE" dirty="0" smtClean="0"/>
+              <a:t>Mastertextformat bearbeiten</a:t>
+            </a:r>
+          </a:p>
+          <a:p>
+            <a:pPr lvl="1">
               <a:spcBef>
                 <a:spcPts val="300"/>
               </a:spcBef>
               <a:spcAft>
                 <a:spcPts val="0"/>
               </a:spcAft>
-              <a:defRPr sz="1800" b="1">
-                <a:latin typeface="PT Sans" charset="-52"/>
-                <a:ea typeface="PT Sans" charset="-52"/>
-                <a:cs typeface="PT Sans" charset="-52"/>
-              </a:defRPr>
-            </a:lvl2pPr>
-            <a:lvl3pPr>
-              <a:spcBef>
-                <a:spcPts val="300"/>
-              </a:spcBef>
-              <a:defRPr sz="1800" b="1">
-                <a:latin typeface="PT Sans" charset="-52"/>
-                <a:ea typeface="PT Sans" charset="-52"/>
-                <a:cs typeface="PT Sans" charset="-52"/>
-              </a:defRPr>
-            </a:lvl3pPr>
-            <a:lvl4pPr>
-              <a:spcBef>
-                <a:spcPts val="0"/>
-              </a:spcBef>
-              <a:defRPr sz="1800">
-                <a:latin typeface="PT Sans" charset="-52"/>
-                <a:ea typeface="PT Sans" charset="-52"/>
-                <a:cs typeface="PT Sans" charset="-52"/>
-              </a:defRPr>
-            </a:lvl4pPr>
-            <a:lvl5pPr>
-              <a:spcBef>
-                <a:spcPts val="0"/>
-              </a:spcBef>
-              <a:defRPr sz="1800">
-                <a:latin typeface="PT Sans" charset="-52"/>
-                <a:ea typeface="PT Sans" charset="-52"/>
-                <a:cs typeface="PT Sans" charset="-52"/>
-              </a:defRPr>
-            </a:lvl5pPr>
-          </a:lstStyle>
-          <a:p>
-            <a:pPr lvl="0"/>
-            <a:r>
-              <a:rPr lang="de-DE" dirty="0" smtClean="0"/>
-              <a:t>Mastertextformat bearbeiten</a:t>
-            </a:r>
-          </a:p>
-          <a:p>
-            <a:pPr lvl="1"/>
+            </a:pPr>
             <a:r>
               <a:rPr lang="de-DE" dirty="0" smtClean="0"/>
               <a:t>Zweite Ebene</a:t>
             </a:r>
           </a:p>
           <a:p>
-            <a:pPr lvl="2"/>
+            <a:pPr lvl="2">
+              <a:spcBef>
+                <a:spcPts val="300"/>
+              </a:spcBef>
+            </a:pPr>
             <a:r>
               <a:rPr lang="de-DE" dirty="0" smtClean="0"/>
               <a:t>Dritte Ebene</a:t>
             </a:r>
           </a:p>
           <a:p>
-            <a:pPr lvl="3"/>
+            <a:pPr lvl="3">
+              <a:spcBef>
+                <a:spcPts val="0"/>
+              </a:spcBef>
+            </a:pPr>
             <a:r>
               <a:rPr lang="de-DE" dirty="0" smtClean="0"/>
               <a:t>Vierte Ebene</a:t>
             </a:r>
           </a:p>
           <a:p>
-            <a:pPr lvl="4"/>
+            <a:pPr lvl="4">
+              <a:spcBef>
+                <a:spcPts val="0"/>
+              </a:spcBef>
+            </a:pPr>
             <a:r>
               <a:rPr lang="de-DE" dirty="0" smtClean="0"/>
               <a:t>Fünfte Ebene</a:t>
@@ -1848,8 +1874,8 @@
         </p:nvSpPr>
         <p:spPr>
           <a:xfrm>
-            <a:off x="4837113" y="1347615"/>
-            <a:ext cx="3859260" cy="3247008"/>
+            <a:off x="4644008" y="1419621"/>
+            <a:ext cx="4291308" cy="3175001"/>
           </a:xfrm>
           <a:prstGeom prst="rect">
             <a:avLst/>
@@ -1859,89 +1885,94 @@
           <a:bodyPr/>
           <a:lstStyle>
             <a:lvl1pPr>
+              <a:defRPr lang="de-DE" sz="2000" b="0" dirty="0" smtClean="0">
+                <a:latin typeface="PT Sans" charset="-52"/>
+                <a:ea typeface="PT Sans" charset="-52"/>
+                <a:cs typeface="PT Sans" charset="-52"/>
+              </a:defRPr>
+            </a:lvl1pPr>
+            <a:lvl2pPr>
+              <a:defRPr lang="de-DE" sz="1800" b="0" dirty="0" smtClean="0">
+                <a:latin typeface="PT Sans" charset="-52"/>
+                <a:ea typeface="PT Sans" charset="-52"/>
+                <a:cs typeface="PT Sans" charset="-52"/>
+              </a:defRPr>
+            </a:lvl2pPr>
+            <a:lvl3pPr>
+              <a:defRPr lang="de-DE" sz="1800" b="0" dirty="0" smtClean="0">
+                <a:latin typeface="PT Sans" charset="-52"/>
+                <a:ea typeface="PT Sans" charset="-52"/>
+                <a:cs typeface="PT Sans" charset="-52"/>
+              </a:defRPr>
+            </a:lvl3pPr>
+            <a:lvl4pPr>
+              <a:defRPr lang="de-DE" sz="1800" dirty="0" smtClean="0">
+                <a:latin typeface="PT Sans" charset="-52"/>
+                <a:ea typeface="PT Sans" charset="-52"/>
+                <a:cs typeface="PT Sans" charset="-52"/>
+              </a:defRPr>
+            </a:lvl4pPr>
+            <a:lvl5pPr>
+              <a:defRPr lang="de-DE" sz="1800" b="0" dirty="0">
+                <a:latin typeface="PT Sans" charset="-52"/>
+                <a:ea typeface="PT Sans" charset="-52"/>
+                <a:cs typeface="PT Sans" charset="-52"/>
+              </a:defRPr>
+            </a:lvl5pPr>
+          </a:lstStyle>
+          <a:p>
+            <a:pPr lvl="0">
               <a:spcBef>
                 <a:spcPts val="600"/>
               </a:spcBef>
-              <a:defRPr sz="2400" b="1">
-                <a:latin typeface="PT Sans" charset="-52"/>
-                <a:ea typeface="PT Sans" charset="-52"/>
-                <a:cs typeface="PT Sans" charset="-52"/>
-              </a:defRPr>
-            </a:lvl1pPr>
-            <a:lvl2pPr>
+            </a:pPr>
+            <a:r>
+              <a:rPr lang="de-DE" dirty="0" smtClean="0"/>
+              <a:t>Mastertextformat bearbeiten</a:t>
+            </a:r>
+          </a:p>
+          <a:p>
+            <a:pPr lvl="1">
               <a:spcBef>
                 <a:spcPts val="300"/>
               </a:spcBef>
               <a:spcAft>
                 <a:spcPts val="0"/>
               </a:spcAft>
-              <a:defRPr sz="1800" b="1">
-                <a:latin typeface="PT Sans" charset="-52"/>
-                <a:ea typeface="PT Sans" charset="-52"/>
-                <a:cs typeface="PT Sans" charset="-52"/>
-              </a:defRPr>
-            </a:lvl2pPr>
-            <a:lvl3pPr>
-              <a:spcBef>
-                <a:spcPts val="300"/>
-              </a:spcBef>
-              <a:defRPr sz="1800" b="1">
-                <a:latin typeface="PT Sans" charset="-52"/>
-                <a:ea typeface="PT Sans" charset="-52"/>
-                <a:cs typeface="PT Sans" charset="-52"/>
-              </a:defRPr>
-            </a:lvl3pPr>
-            <a:lvl4pPr>
-              <a:spcBef>
-                <a:spcPts val="0"/>
-              </a:spcBef>
-              <a:defRPr sz="1800">
-                <a:latin typeface="PT Sans" charset="-52"/>
-                <a:ea typeface="PT Sans" charset="-52"/>
-                <a:cs typeface="PT Sans" charset="-52"/>
-              </a:defRPr>
-            </a:lvl4pPr>
-            <a:lvl5pPr>
-              <a:spcBef>
-                <a:spcPts val="0"/>
-              </a:spcBef>
-              <a:defRPr sz="1800">
-                <a:latin typeface="PT Sans" charset="-52"/>
-                <a:ea typeface="PT Sans" charset="-52"/>
-                <a:cs typeface="PT Sans" charset="-52"/>
-              </a:defRPr>
-            </a:lvl5pPr>
-          </a:lstStyle>
-          <a:p>
-            <a:pPr lvl="0"/>
-            <a:r>
-              <a:rPr lang="de-DE" dirty="0" smtClean="0"/>
-              <a:t>Mastertextformat bearbeiten</a:t>
-            </a:r>
-          </a:p>
-          <a:p>
-            <a:pPr lvl="1"/>
+            </a:pPr>
             <a:r>
               <a:rPr lang="de-DE" dirty="0" smtClean="0"/>
               <a:t>Zweite Ebene</a:t>
             </a:r>
           </a:p>
           <a:p>
-            <a:pPr lvl="2"/>
+            <a:pPr lvl="2">
+              <a:spcBef>
+                <a:spcPts val="300"/>
+              </a:spcBef>
+            </a:pPr>
             <a:r>
               <a:rPr lang="de-DE" dirty="0" smtClean="0"/>
               <a:t>Dritte Ebene</a:t>
             </a:r>
           </a:p>
           <a:p>
-            <a:pPr lvl="3"/>
+            <a:pPr lvl="3">
+              <a:spcBef>
+                <a:spcPts val="0"/>
+              </a:spcBef>
+            </a:pPr>
             <a:r>
               <a:rPr lang="de-DE" dirty="0" smtClean="0"/>
               <a:t>Vierte Ebene</a:t>
             </a:r>
           </a:p>
           <a:p>
-            <a:pPr lvl="4"/>
+            <a:pPr lvl="4">
+              <a:spcBef>
+                <a:spcPts val="0"/>
+              </a:spcBef>
+            </a:pPr>
             <a:r>
               <a:rPr lang="de-DE" dirty="0" smtClean="0"/>
               <a:t>Fünfte Ebene</a:t>
@@ -1956,12 +1987,19 @@
   <p:clrMapOvr>
     <a:masterClrMapping/>
   </p:clrMapOvr>
+  <p:timing>
+    <p:tnLst>
+      <p:par>
+        <p:cTn id="1" dur="indefinite" restart="never" nodeType="tmRoot"/>
+      </p:par>
+    </p:tnLst>
+  </p:timing>
 </p:sldLayout>
 </file>
 
 <file path=ppt/slideLayouts/slideLayout5.xml><?xml version="1.0" encoding="utf-8"?>
 <p:sldLayout xmlns:a="http://schemas.openxmlformats.org/drawingml/2006/main" xmlns:r="http://schemas.openxmlformats.org/officeDocument/2006/relationships" xmlns:p="http://schemas.openxmlformats.org/presentationml/2006/main" preserve="1" userDrawn="1">
-  <p:cSld name="leere Folie">
+  <p:cSld name="Empty Slide">
     <p:spTree>
       <p:nvGrpSpPr>
         <p:cNvPr id="1" name=""/>
@@ -1993,7 +2031,7 @@
           <a:p>
             <a:fld id="{DAC7B467-4091-D240-A022-A9C1CF2B750A}" type="datetime1">
               <a:rPr lang="de-DE" smtClean="0"/>
-              <a:t>30.09.16</a:t>
+              <a:t>24.01.17</a:t>
             </a:fld>
             <a:endParaRPr lang="de-DE" dirty="0" smtClean="0"/>
           </a:p>
@@ -2056,12 +2094,19 @@
   <p:clrMapOvr>
     <a:masterClrMapping/>
   </p:clrMapOvr>
+  <p:timing>
+    <p:tnLst>
+      <p:par>
+        <p:cTn id="1" dur="indefinite" restart="never" nodeType="tmRoot"/>
+      </p:par>
+    </p:tnLst>
+  </p:timing>
 </p:sldLayout>
 </file>
 
 <file path=ppt/slideLayouts/slideLayout6.xml><?xml version="1.0" encoding="utf-8"?>
 <p:sldLayout xmlns:a="http://schemas.openxmlformats.org/drawingml/2006/main" xmlns:r="http://schemas.openxmlformats.org/officeDocument/2006/relationships" xmlns:p="http://schemas.openxmlformats.org/presentationml/2006/main" preserve="1" userDrawn="1">
-  <p:cSld name="Zwischenüberschrift">
+  <p:cSld name="Intermediate Headline">
     <p:spTree>
       <p:nvGrpSpPr>
         <p:cNvPr id="1" name=""/>
@@ -2093,7 +2138,7 @@
           <a:p>
             <a:fld id="{0D0BEEEE-7771-FC4B-9EAD-6B2B54CF3879}" type="datetime1">
               <a:rPr lang="de-DE" smtClean="0"/>
-              <a:t>30.09.16</a:t>
+              <a:t>24.01.17</a:t>
             </a:fld>
             <a:endParaRPr lang="de-DE" dirty="0" smtClean="0"/>
           </a:p>
@@ -2148,7 +2193,7 @@
       </p:sp>
       <p:sp>
         <p:nvSpPr>
-          <p:cNvPr id="6" name="Untertitel 2"/>
+          <p:cNvPr id="7" name="Untertitel 2"/>
           <p:cNvSpPr>
             <a:spLocks noGrp="1"/>
           </p:cNvSpPr>
@@ -2158,8 +2203,8 @@
         </p:nvSpPr>
         <p:spPr>
           <a:xfrm>
-            <a:off x="688428" y="3003798"/>
-            <a:ext cx="7726572" cy="586951"/>
+            <a:off x="467544" y="3201490"/>
+            <a:ext cx="7726572" cy="474811"/>
           </a:xfrm>
           <a:prstGeom prst="rect">
             <a:avLst/>
@@ -2172,7 +2217,7 @@
           <a:lstStyle>
             <a:lvl1pPr marL="0" indent="0" algn="l">
               <a:buNone/>
-              <a:defRPr>
+              <a:defRPr sz="2000" b="0">
                 <a:solidFill>
                   <a:schemeClr val="tx1">
                     <a:tint val="75000"/>
@@ -2275,7 +2320,7 @@
       </p:sp>
       <p:sp>
         <p:nvSpPr>
-          <p:cNvPr id="8" name="Titel 1"/>
+          <p:cNvPr id="9" name="Titel 1"/>
           <p:cNvSpPr>
             <a:spLocks noGrp="1"/>
           </p:cNvSpPr>
@@ -2285,8 +2330,8 @@
         </p:nvSpPr>
         <p:spPr>
           <a:xfrm>
-            <a:off x="688428" y="2067694"/>
-            <a:ext cx="7726572" cy="720080"/>
+            <a:off x="467544" y="2643758"/>
+            <a:ext cx="7726572" cy="557732"/>
           </a:xfrm>
           <a:prstGeom prst="rect">
             <a:avLst/>
@@ -2298,7 +2343,7 @@
           </a:bodyPr>
           <a:lstStyle>
             <a:lvl1pPr algn="l">
-              <a:defRPr sz="4000" b="1">
+              <a:defRPr sz="2800" b="1">
                 <a:solidFill>
                   <a:schemeClr val="tx2"/>
                 </a:solidFill>
@@ -2319,6 +2364,13 @@
   <p:clrMapOvr>
     <a:masterClrMapping/>
   </p:clrMapOvr>
+  <p:timing>
+    <p:tnLst>
+      <p:par>
+        <p:cTn id="1" dur="indefinite" restart="never" nodeType="tmRoot"/>
+      </p:par>
+    </p:tnLst>
+  </p:timing>
 </p:sldLayout>
 </file>
 
@@ -2428,7 +2480,7 @@
             <a:fld id="{0D0BEEEE-7771-FC4B-9EAD-6B2B54CF3879}" type="datetime1">
               <a:rPr lang="de-DE" smtClean="0"/>
               <a:pPr/>
-              <a:t>30.09.16</a:t>
+              <a:t>24.01.17</a:t>
             </a:fld>
             <a:endParaRPr lang="de-DE" dirty="0" smtClean="0"/>
           </a:p>
@@ -2535,6 +2587,13 @@
     <p:sldLayoutId id="2147483661" r:id="rId5"/>
     <p:sldLayoutId id="2147483665" r:id="rId6"/>
   </p:sldLayoutIdLst>
+  <p:timing>
+    <p:tnLst>
+      <p:par>
+        <p:cTn id="1" dur="indefinite" restart="never" nodeType="tmRoot"/>
+      </p:par>
+    </p:tnLst>
+  </p:timing>
   <p:hf hdr="0"/>
   <p:txStyles>
     <p:titleStyle>
@@ -2852,7 +2911,7 @@
           <a:p>
             <a:fld id="{464DF79A-7FC5-C04C-B226-BE0364E46518}" type="datetime1">
               <a:rPr lang="de-DE" smtClean="0"/>
-              <a:t>30.09.16</a:t>
+              <a:t>24.01.17</a:t>
             </a:fld>
             <a:endParaRPr lang="de-DE" dirty="0"/>
           </a:p>
@@ -2871,7 +2930,7 @@
         <p:spPr/>
         <p:txBody>
           <a:bodyPr>
-            <a:normAutofit fontScale="90000"/>
+            <a:normAutofit/>
           </a:bodyPr>
           <a:lstStyle/>
           <a:p>
@@ -3011,7 +3070,7 @@
         <p:spPr/>
         <p:txBody>
           <a:bodyPr>
-            <a:normAutofit/>
+            <a:normAutofit fontScale="90000"/>
           </a:bodyPr>
           <a:lstStyle/>
           <a:p>
@@ -3036,7 +3095,7 @@
           <a:p>
             <a:fld id="{9D28A08E-4CF7-FA46-835F-B2FFD2D4754F}" type="datetime1">
               <a:rPr lang="de-DE" smtClean="0"/>
-              <a:t>30.09.16</a:t>
+              <a:t>24.01.17</a:t>
             </a:fld>
             <a:endParaRPr lang="de-DE"/>
           </a:p>
@@ -3098,6 +3157,13 @@
   <p:clrMapOvr>
     <a:masterClrMapping/>
   </p:clrMapOvr>
+  <p:timing>
+    <p:tnLst>
+      <p:par>
+        <p:cTn id="1" dur="indefinite" restart="never" nodeType="tmRoot"/>
+      </p:par>
+    </p:tnLst>
+  </p:timing>
 </p:sld>
 </file>
 

</xml_diff>